<commit_message>
add bacteria slide, edit avg plot
</commit_message>
<xml_diff>
--- a/Milestone 1.pptx
+++ b/Milestone 1.pptx
@@ -5,7 +5,7 @@
     <p:sldMasterId id="2147483648" r:id="rId1"/>
   </p:sldMasterIdLst>
   <p:notesMasterIdLst>
-    <p:notesMasterId r:id="rId19"/>
+    <p:notesMasterId r:id="rId20"/>
   </p:notesMasterIdLst>
   <p:sldIdLst>
     <p:sldId id="256" r:id="rId2"/>
@@ -24,7 +24,8 @@
     <p:sldId id="259" r:id="rId15"/>
     <p:sldId id="258" r:id="rId16"/>
     <p:sldId id="262" r:id="rId17"/>
-    <p:sldId id="263" r:id="rId18"/>
+    <p:sldId id="273" r:id="rId18"/>
+    <p:sldId id="263" r:id="rId19"/>
   </p:sldIdLst>
   <p:sldSz cx="12192000" cy="6858000"/>
   <p:notesSz cx="6858000" cy="9144000"/>
@@ -242,7 +243,7 @@
           <a:p>
             <a:fld id="{E3B19E15-807E-4448-8252-3FAE93D1E26B}" type="datetimeFigureOut">
               <a:rPr lang="he-IL" smtClean="0"/>
-              <a:t>ט'/תמוז/תשפ"ד</a:t>
+              <a:t>י'/תמוז/תשפ"ד</a:t>
             </a:fld>
             <a:endParaRPr lang="he-IL"/>
           </a:p>
@@ -1107,6 +1108,30 @@
               <a:rPr lang="he-IL" dirty="0"/>
               <a:t> או זיהומים בתהליך האיסוף</a:t>
             </a:r>
+            <a:endParaRPr lang="en-US" dirty="0"/>
+          </a:p>
+          <a:p>
+            <a:pPr algn="r"/>
+            <a:r>
+              <a:rPr lang="he-IL" dirty="0"/>
+              <a:t>נראה כי לדגימות באותו יום מטא-</a:t>
+            </a:r>
+            <a:r>
+              <a:rPr lang="he-IL" dirty="0" err="1"/>
+              <a:t>דאטא</a:t>
+            </a:r>
+            <a:r>
+              <a:rPr lang="he-IL" dirty="0"/>
+              <a:t> זהה לחלוטין (כלומר גם עבור דיאטה), לכן למרות שעשויים להיות שינויים </a:t>
+            </a:r>
+            <a:r>
+              <a:rPr lang="he-IL" dirty="0" err="1"/>
+              <a:t>במיקרוביום</a:t>
+            </a:r>
+            <a:r>
+              <a:rPr lang="he-IL" dirty="0"/>
+              <a:t>, זה לא משהו שאנחנו ננסה לחזות ברזולוציה כזו.</a:t>
+            </a:r>
             <a:endParaRPr lang="en-IL" dirty="0"/>
           </a:p>
         </p:txBody>
@@ -1285,15 +1310,7 @@
             <a:pPr algn="r" rtl="1"/>
             <a:r>
               <a:rPr lang="he-IL" dirty="0"/>
-              <a:t>עבור כל בבון חישבנו את הדגימה </a:t>
-            </a:r>
-            <a:r>
-              <a:rPr lang="he-IL" dirty="0" err="1"/>
-              <a:t>ההממוצעת</a:t>
-            </a:r>
-            <a:r>
-              <a:rPr lang="he-IL" dirty="0"/>
-              <a:t>, ולאחר מכן חישבנו מרחק </a:t>
+              <a:t>עבור כל בבון חישבנו את הממוצע של כל הדגימות הקודמות, ולאחר מכן חישבנו מרחק </a:t>
             </a:r>
             <a:r>
               <a:rPr lang="en-US" dirty="0"/>
@@ -1305,22 +1322,14 @@
             </a:r>
             <a:r>
               <a:rPr lang="he-IL" dirty="0"/>
-              <a:t> מכל דגימה של הבבון לדגימה הממוצעת</a:t>
+              <a:t> מדגימה זו לממוצע הרלוונטי.</a:t>
             </a:r>
           </a:p>
           <a:p>
             <a:pPr algn="r" rtl="1"/>
             <a:r>
               <a:rPr lang="he-IL" dirty="0"/>
-              <a:t>כל המרחקים של כל הבבונים </a:t>
-            </a:r>
-            <a:r>
-              <a:rPr lang="he-IL" dirty="0" err="1"/>
-              <a:t>מתואים</a:t>
-            </a:r>
-            <a:r>
-              <a:rPr lang="he-IL" dirty="0"/>
-              <a:t> בגרף</a:t>
+              <a:t>כל המרחקים של כל הבבונים מתוארים בגרף.</a:t>
             </a:r>
           </a:p>
           <a:p>
@@ -1645,6 +1654,95 @@
     <p:extLst>
       <p:ext uri="{BB962C8B-B14F-4D97-AF65-F5344CB8AC3E}">
         <p14:creationId xmlns:p14="http://schemas.microsoft.com/office/powerpoint/2010/main" val="1405160873"/>
+      </p:ext>
+    </p:extLst>
+  </p:cSld>
+  <p:clrMapOvr>
+    <a:masterClrMapping/>
+  </p:clrMapOvr>
+</p:notes>
+</file>
+
+<file path=ppt/notesSlides/notesSlide9.xml><?xml version="1.0" encoding="utf-8"?>
+<p:notes xmlns:a="http://schemas.openxmlformats.org/drawingml/2006/main" xmlns:r="http://schemas.openxmlformats.org/officeDocument/2006/relationships" xmlns:p="http://schemas.openxmlformats.org/presentationml/2006/main">
+  <p:cSld>
+    <p:spTree>
+      <p:nvGrpSpPr>
+        <p:cNvPr id="1" name=""/>
+        <p:cNvGrpSpPr/>
+        <p:nvPr/>
+      </p:nvGrpSpPr>
+      <p:grpSpPr>
+        <a:xfrm>
+          <a:off x="0" y="0"/>
+          <a:ext cx="0" cy="0"/>
+          <a:chOff x="0" y="0"/>
+          <a:chExt cx="0" cy="0"/>
+        </a:xfrm>
+      </p:grpSpPr>
+      <p:sp>
+        <p:nvSpPr>
+          <p:cNvPr id="2" name="Slide Image Placeholder 1"/>
+          <p:cNvSpPr>
+            <a:spLocks noGrp="1" noRot="1" noChangeAspect="1"/>
+          </p:cNvSpPr>
+          <p:nvPr>
+            <p:ph type="sldImg"/>
+          </p:nvPr>
+        </p:nvSpPr>
+        <p:spPr/>
+      </p:sp>
+      <p:sp>
+        <p:nvSpPr>
+          <p:cNvPr id="3" name="Notes Placeholder 2"/>
+          <p:cNvSpPr>
+            <a:spLocks noGrp="1"/>
+          </p:cNvSpPr>
+          <p:nvPr>
+            <p:ph type="body" idx="1"/>
+          </p:nvPr>
+        </p:nvSpPr>
+        <p:spPr/>
+        <p:txBody>
+          <a:bodyPr/>
+          <a:lstStyle/>
+          <a:p>
+            <a:pPr algn="r" rtl="1"/>
+            <a:r>
+              <a:rPr lang="he-IL" dirty="0"/>
+              <a:t>מיקוד בחיזוי מורכב רק עבור ה-6, עבור שאר החיידקים – אולי ניתן להסתפק במודל פשוט</a:t>
+            </a:r>
+            <a:endParaRPr lang="en-IL" dirty="0"/>
+          </a:p>
+        </p:txBody>
+      </p:sp>
+      <p:sp>
+        <p:nvSpPr>
+          <p:cNvPr id="4" name="Slide Number Placeholder 3"/>
+          <p:cNvSpPr>
+            <a:spLocks noGrp="1"/>
+          </p:cNvSpPr>
+          <p:nvPr>
+            <p:ph type="sldNum" sz="quarter" idx="5"/>
+          </p:nvPr>
+        </p:nvSpPr>
+        <p:spPr/>
+        <p:txBody>
+          <a:bodyPr/>
+          <a:lstStyle/>
+          <a:p>
+            <a:fld id="{1953AF5B-F3A6-48BF-9D5A-53DBBACACE09}" type="slidenum">
+              <a:rPr lang="he-IL" smtClean="0"/>
+              <a:t>17</a:t>
+            </a:fld>
+            <a:endParaRPr lang="he-IL"/>
+          </a:p>
+        </p:txBody>
+      </p:sp>
+    </p:spTree>
+    <p:extLst>
+      <p:ext uri="{BB962C8B-B14F-4D97-AF65-F5344CB8AC3E}">
+        <p14:creationId xmlns:p14="http://schemas.microsoft.com/office/powerpoint/2010/main" val="2556935683"/>
       </p:ext>
     </p:extLst>
   </p:cSld>
@@ -1803,7 +1901,7 @@
           <a:p>
             <a:fld id="{BD9CB361-BAEB-499F-9012-48A2D14050D0}" type="datetimeFigureOut">
               <a:rPr lang="he-IL" smtClean="0"/>
-              <a:t>ט'/תמוז/תשפ"ד</a:t>
+              <a:t>י'/תמוז/תשפ"ד</a:t>
             </a:fld>
             <a:endParaRPr lang="he-IL"/>
           </a:p>
@@ -2003,7 +2101,7 @@
           <a:p>
             <a:fld id="{BD9CB361-BAEB-499F-9012-48A2D14050D0}" type="datetimeFigureOut">
               <a:rPr lang="he-IL" smtClean="0"/>
-              <a:t>ט'/תמוז/תשפ"ד</a:t>
+              <a:t>י'/תמוז/תשפ"ד</a:t>
             </a:fld>
             <a:endParaRPr lang="he-IL"/>
           </a:p>
@@ -2213,7 +2311,7 @@
           <a:p>
             <a:fld id="{BD9CB361-BAEB-499F-9012-48A2D14050D0}" type="datetimeFigureOut">
               <a:rPr lang="he-IL" smtClean="0"/>
-              <a:t>ט'/תמוז/תשפ"ד</a:t>
+              <a:t>י'/תמוז/תשפ"ד</a:t>
             </a:fld>
             <a:endParaRPr lang="he-IL"/>
           </a:p>
@@ -2413,7 +2511,7 @@
           <a:p>
             <a:fld id="{BD9CB361-BAEB-499F-9012-48A2D14050D0}" type="datetimeFigureOut">
               <a:rPr lang="he-IL" smtClean="0"/>
-              <a:t>ט'/תמוז/תשפ"ד</a:t>
+              <a:t>י'/תמוז/תשפ"ד</a:t>
             </a:fld>
             <a:endParaRPr lang="he-IL"/>
           </a:p>
@@ -2689,7 +2787,7 @@
           <a:p>
             <a:fld id="{BD9CB361-BAEB-499F-9012-48A2D14050D0}" type="datetimeFigureOut">
               <a:rPr lang="he-IL" smtClean="0"/>
-              <a:t>ט'/תמוז/תשפ"ד</a:t>
+              <a:t>י'/תמוז/תשפ"ד</a:t>
             </a:fld>
             <a:endParaRPr lang="he-IL"/>
           </a:p>
@@ -2957,7 +3055,7 @@
           <a:p>
             <a:fld id="{BD9CB361-BAEB-499F-9012-48A2D14050D0}" type="datetimeFigureOut">
               <a:rPr lang="he-IL" smtClean="0"/>
-              <a:t>ט'/תמוז/תשפ"ד</a:t>
+              <a:t>י'/תמוז/תשפ"ד</a:t>
             </a:fld>
             <a:endParaRPr lang="he-IL"/>
           </a:p>
@@ -3372,7 +3470,7 @@
           <a:p>
             <a:fld id="{BD9CB361-BAEB-499F-9012-48A2D14050D0}" type="datetimeFigureOut">
               <a:rPr lang="he-IL" smtClean="0"/>
-              <a:t>ט'/תמוז/תשפ"ד</a:t>
+              <a:t>י'/תמוז/תשפ"ד</a:t>
             </a:fld>
             <a:endParaRPr lang="he-IL"/>
           </a:p>
@@ -3514,7 +3612,7 @@
           <a:p>
             <a:fld id="{BD9CB361-BAEB-499F-9012-48A2D14050D0}" type="datetimeFigureOut">
               <a:rPr lang="he-IL" smtClean="0"/>
-              <a:t>ט'/תמוז/תשפ"ד</a:t>
+              <a:t>י'/תמוז/תשפ"ד</a:t>
             </a:fld>
             <a:endParaRPr lang="he-IL"/>
           </a:p>
@@ -3627,7 +3725,7 @@
           <a:p>
             <a:fld id="{BD9CB361-BAEB-499F-9012-48A2D14050D0}" type="datetimeFigureOut">
               <a:rPr lang="he-IL" smtClean="0"/>
-              <a:t>ט'/תמוז/תשפ"ד</a:t>
+              <a:t>י'/תמוז/תשפ"ד</a:t>
             </a:fld>
             <a:endParaRPr lang="he-IL"/>
           </a:p>
@@ -3940,7 +4038,7 @@
           <a:p>
             <a:fld id="{BD9CB361-BAEB-499F-9012-48A2D14050D0}" type="datetimeFigureOut">
               <a:rPr lang="he-IL" smtClean="0"/>
-              <a:t>ט'/תמוז/תשפ"ד</a:t>
+              <a:t>י'/תמוז/תשפ"ד</a:t>
             </a:fld>
             <a:endParaRPr lang="he-IL"/>
           </a:p>
@@ -4229,7 +4327,7 @@
           <a:p>
             <a:fld id="{BD9CB361-BAEB-499F-9012-48A2D14050D0}" type="datetimeFigureOut">
               <a:rPr lang="he-IL" smtClean="0"/>
-              <a:t>ט'/תמוז/תשפ"ד</a:t>
+              <a:t>י'/תמוז/תשפ"ד</a:t>
             </a:fld>
             <a:endParaRPr lang="he-IL"/>
           </a:p>
@@ -4472,7 +4570,7 @@
           <a:p>
             <a:fld id="{BD9CB361-BAEB-499F-9012-48A2D14050D0}" type="datetimeFigureOut">
               <a:rPr lang="he-IL" smtClean="0"/>
-              <a:t>ט'/תמוז/תשפ"ד</a:t>
+              <a:t>י'/תמוז/תשפ"ד</a:t>
             </a:fld>
             <a:endParaRPr lang="he-IL"/>
           </a:p>
@@ -5738,13 +5836,6 @@
           <a:lstStyle/>
           <a:p>
             <a:r>
-              <a:rPr lang="en-US" b="1" dirty="0"/>
-              <a:t>Men Are from Mars, Women Are from Venus</a:t>
-            </a:r>
-            <a:br>
-              <a:rPr lang="he-IL" dirty="0"/>
-            </a:br>
-            <a:r>
               <a:rPr lang="en-US" dirty="0"/>
               <a:t>Female Vs Male – how different are they?</a:t>
             </a:r>
@@ -5893,6 +5984,112 @@
 </file>
 
 <file path=ppt/slides/slide17.xml><?xml version="1.0" encoding="utf-8"?>
+<p:sld xmlns:a="http://schemas.openxmlformats.org/drawingml/2006/main" xmlns:r="http://schemas.openxmlformats.org/officeDocument/2006/relationships" xmlns:p="http://schemas.openxmlformats.org/presentationml/2006/main" show="0">
+  <p:cSld>
+    <p:spTree>
+      <p:nvGrpSpPr>
+        <p:cNvPr id="1" name=""/>
+        <p:cNvGrpSpPr/>
+        <p:nvPr/>
+      </p:nvGrpSpPr>
+      <p:grpSpPr>
+        <a:xfrm>
+          <a:off x="0" y="0"/>
+          <a:ext cx="0" cy="0"/>
+          <a:chOff x="0" y="0"/>
+          <a:chExt cx="0" cy="0"/>
+        </a:xfrm>
+      </p:grpSpPr>
+      <p:sp>
+        <p:nvSpPr>
+          <p:cNvPr id="2" name="Title 1">
+            <a:extLst>
+              <a:ext uri="{FF2B5EF4-FFF2-40B4-BE49-F238E27FC236}">
+                <a16:creationId xmlns:a16="http://schemas.microsoft.com/office/drawing/2014/main" id="{B8F74EA1-A6A0-3E68-010B-D1B917339268}"/>
+              </a:ext>
+            </a:extLst>
+          </p:cNvPr>
+          <p:cNvSpPr>
+            <a:spLocks noGrp="1"/>
+          </p:cNvSpPr>
+          <p:nvPr>
+            <p:ph type="title"/>
+          </p:nvPr>
+        </p:nvSpPr>
+        <p:spPr/>
+        <p:txBody>
+          <a:bodyPr/>
+          <a:lstStyle/>
+          <a:p>
+            <a:r>
+              <a:rPr lang="en-US" dirty="0"/>
+              <a:t>Most common bacteria</a:t>
+            </a:r>
+            <a:endParaRPr lang="en-IL" dirty="0"/>
+          </a:p>
+        </p:txBody>
+      </p:sp>
+      <p:sp>
+        <p:nvSpPr>
+          <p:cNvPr id="3" name="Content Placeholder 2">
+            <a:extLst>
+              <a:ext uri="{FF2B5EF4-FFF2-40B4-BE49-F238E27FC236}">
+                <a16:creationId xmlns:a16="http://schemas.microsoft.com/office/drawing/2014/main" id="{00799CF5-C77C-4A37-B6DB-58CFF83103A0}"/>
+              </a:ext>
+            </a:extLst>
+          </p:cNvPr>
+          <p:cNvSpPr>
+            <a:spLocks noGrp="1"/>
+          </p:cNvSpPr>
+          <p:nvPr>
+            <p:ph idx="1"/>
+          </p:nvPr>
+        </p:nvSpPr>
+        <p:spPr/>
+        <p:txBody>
+          <a:bodyPr/>
+          <a:lstStyle/>
+          <a:p>
+            <a:r>
+              <a:rPr lang="en-US" dirty="0"/>
+              <a:t>6 most common bacteria constitute over 68% of the composition</a:t>
+            </a:r>
+            <a:endParaRPr lang="he-IL" dirty="0"/>
+          </a:p>
+          <a:p>
+            <a:r>
+              <a:rPr lang="en-US" dirty="0"/>
+              <a:t>Focus on this group of bacteria</a:t>
+            </a:r>
+            <a:endParaRPr lang="he-IL" dirty="0"/>
+          </a:p>
+          <a:p>
+            <a:r>
+              <a:rPr lang="en-US"/>
+              <a:t>Correlation between different </a:t>
+            </a:r>
+            <a:r>
+              <a:rPr lang="en-US" dirty="0"/>
+              <a:t>bacteria</a:t>
+            </a:r>
+            <a:endParaRPr lang="en-IL" dirty="0"/>
+          </a:p>
+        </p:txBody>
+      </p:sp>
+    </p:spTree>
+    <p:extLst>
+      <p:ext uri="{BB962C8B-B14F-4D97-AF65-F5344CB8AC3E}">
+        <p14:creationId xmlns:p14="http://schemas.microsoft.com/office/powerpoint/2010/main" val="3952605482"/>
+      </p:ext>
+    </p:extLst>
+  </p:cSld>
+  <p:clrMapOvr>
+    <a:masterClrMapping/>
+  </p:clrMapOvr>
+</p:sld>
+</file>
+
+<file path=ppt/slides/slide18.xml><?xml version="1.0" encoding="utf-8"?>
 <p:sld xmlns:a="http://schemas.openxmlformats.org/drawingml/2006/main" xmlns:r="http://schemas.openxmlformats.org/officeDocument/2006/relationships" xmlns:p="http://schemas.openxmlformats.org/presentationml/2006/main">
   <p:cSld>
     <p:spTree>
@@ -6900,10 +7097,10 @@
       </p:sp>
       <p:pic>
         <p:nvPicPr>
-          <p:cNvPr id="5" name="Content Placeholder 4" descr="A graph of a normal distribution&#10;&#10;Description automatically generated">
-            <a:extLst>
-              <a:ext uri="{FF2B5EF4-FFF2-40B4-BE49-F238E27FC236}">
-                <a16:creationId xmlns:a16="http://schemas.microsoft.com/office/drawing/2014/main" id="{D1B3874B-F45C-4F5C-1A42-4D608278D682}"/>
+          <p:cNvPr id="7" name="Content Placeholder 6">
+            <a:extLst>
+              <a:ext uri="{FF2B5EF4-FFF2-40B4-BE49-F238E27FC236}">
+                <a16:creationId xmlns:a16="http://schemas.microsoft.com/office/drawing/2014/main" id="{11AA93A8-532D-B8EF-746A-13DDC8830E54}"/>
               </a:ext>
             </a:extLst>
           </p:cNvPr>
@@ -6928,8 +7125,8 @@
         </p:blipFill>
         <p:spPr>
           <a:xfrm>
-            <a:off x="3395662" y="1834356"/>
-            <a:ext cx="5400675" cy="4333875"/>
+            <a:off x="2878581" y="1566555"/>
+            <a:ext cx="6434837" cy="5163758"/>
           </a:xfrm>
         </p:spPr>
       </p:pic>

</xml_diff>